<commit_message>
changed check empty table
</commit_message>
<xml_diff>
--- a/presentation.pptx
+++ b/presentation.pptx
@@ -5,10 +5,10 @@
     <p:sldMasterId id="2147483648" r:id="rId1"/>
   </p:sldMasterIdLst>
   <p:notesMasterIdLst>
-    <p:notesMasterId r:id="rId18"/>
+    <p:notesMasterId r:id="rId19"/>
   </p:notesMasterIdLst>
   <p:handoutMasterIdLst>
-    <p:handoutMasterId r:id="rId19"/>
+    <p:handoutMasterId r:id="rId20"/>
   </p:handoutMasterIdLst>
   <p:sldIdLst>
     <p:sldId id="256" r:id="rId2"/>
@@ -26,7 +26,8 @@
     <p:sldId id="261" r:id="rId14"/>
     <p:sldId id="271" r:id="rId15"/>
     <p:sldId id="263" r:id="rId16"/>
-    <p:sldId id="273" r:id="rId17"/>
+    <p:sldId id="274" r:id="rId17"/>
+    <p:sldId id="273" r:id="rId18"/>
   </p:sldIdLst>
   <p:sldSz cx="12192000" cy="6858000"/>
   <p:notesSz cx="6858000" cy="9144000"/>
@@ -125,6 +126,14 @@
       </a:defRPr>
     </a:lvl9pPr>
   </p:defaultTextStyle>
+  <p:extLst>
+    <p:ext uri="{EFAFB233-063F-42B5-8137-9DF3F51BA10A}">
+      <p15:sldGuideLst xmlns:p15="http://schemas.microsoft.com/office/powerpoint/2012/main"/>
+    </p:ext>
+    <p:ext uri="{2D200454-40CA-4A62-9FC3-DE9A4176ACB9}">
+      <p15:notesGuideLst xmlns:p15="http://schemas.microsoft.com/office/powerpoint/2012/main"/>
+    </p:ext>
+  </p:extLst>
 </p:presentation>
 </file>
 
@@ -210,7 +219,7 @@
           <a:p>
             <a:fld id="{5E6F1193-E549-47EA-B306-049AA85C9EEF}" type="datetimeFigureOut">
               <a:rPr lang="en-US" smtClean="0"/>
-              <a:t>2/26/2020</a:t>
+              <a:t>3/4/2020</a:t>
             </a:fld>
             <a:endParaRPr lang="en-US"/>
           </a:p>
@@ -376,7 +385,7 @@
           <a:p>
             <a:fld id="{F4503F0C-142E-4847-9042-7CBB1C0BA685}" type="datetimeFigureOut">
               <a:rPr lang="en-US" smtClean="0"/>
-              <a:t>2/26/2020</a:t>
+              <a:t>3/4/2020</a:t>
             </a:fld>
             <a:endParaRPr lang="en-US"/>
           </a:p>
@@ -871,7 +880,7 @@
           <a:p>
             <a:fld id="{BCDDB253-9AF5-4F20-9BC7-E1FE6037BB7B}" type="datetime1">
               <a:rPr lang="en-US" smtClean="0"/>
-              <a:t>2/26/2020</a:t>
+              <a:t>3/4/2020</a:t>
             </a:fld>
             <a:endParaRPr lang="en-US" dirty="0"/>
           </a:p>
@@ -1081,7 +1090,7 @@
           <a:p>
             <a:fld id="{CA584211-6AEA-4425-B406-C76013846BD9}" type="datetime1">
               <a:rPr lang="en-US" smtClean="0"/>
-              <a:t>2/26/2020</a:t>
+              <a:t>3/4/2020</a:t>
             </a:fld>
             <a:endParaRPr lang="en-US" dirty="0"/>
           </a:p>
@@ -1332,7 +1341,7 @@
           <a:p>
             <a:fld id="{ADB8CC99-D01C-4D15-A5D8-590D71B54781}" type="datetime1">
               <a:rPr lang="en-US" smtClean="0"/>
-              <a:t>2/26/2020</a:t>
+              <a:t>3/4/2020</a:t>
             </a:fld>
             <a:endParaRPr lang="en-US" dirty="0"/>
           </a:p>
@@ -1497,7 +1506,7 @@
           <a:p>
             <a:fld id="{1E33B0C2-FA90-4B8B-848D-05514F40CAAC}" type="datetime1">
               <a:rPr lang="en-US" smtClean="0"/>
-              <a:t>2/26/2020</a:t>
+              <a:t>3/4/2020</a:t>
             </a:fld>
             <a:endParaRPr lang="en-US" dirty="0"/>
           </a:p>
@@ -1842,7 +1851,7 @@
           <a:p>
             <a:fld id="{FE6C0182-E015-480A-9F36-924154E04710}" type="datetime1">
               <a:rPr lang="en-US" smtClean="0"/>
-              <a:t>2/26/2020</a:t>
+              <a:t>3/4/2020</a:t>
             </a:fld>
             <a:endParaRPr lang="en-US" dirty="0"/>
           </a:p>
@@ -2119,7 +2128,7 @@
           <a:p>
             <a:fld id="{216E693B-5E7B-454C-A44D-0E0F1857630D}" type="datetime1">
               <a:rPr lang="en-US" smtClean="0"/>
-              <a:t>2/26/2020</a:t>
+              <a:t>3/4/2020</a:t>
             </a:fld>
             <a:endParaRPr lang="en-US" dirty="0"/>
           </a:p>
@@ -2493,7 +2502,7 @@
           <a:p>
             <a:fld id="{3E4C8982-00E3-4E7C-AC09-02493747439F}" type="datetime1">
               <a:rPr lang="en-US" smtClean="0"/>
-              <a:t>2/26/2020</a:t>
+              <a:t>3/4/2020</a:t>
             </a:fld>
             <a:endParaRPr lang="en-US" dirty="0"/>
           </a:p>
@@ -2606,7 +2615,7 @@
           <a:p>
             <a:fld id="{D72B700C-3E27-4192-8124-7FA7FC27F4E1}" type="datetime1">
               <a:rPr lang="en-US" smtClean="0"/>
-              <a:t>2/26/2020</a:t>
+              <a:t>3/4/2020</a:t>
             </a:fld>
             <a:endParaRPr lang="en-US" dirty="0"/>
           </a:p>
@@ -2772,7 +2781,7 @@
           <a:p>
             <a:fld id="{A935A47F-5808-495B-942F-869E3134ED4D}" type="datetime1">
               <a:rPr lang="en-US" smtClean="0"/>
-              <a:t>2/26/2020</a:t>
+              <a:t>3/4/2020</a:t>
             </a:fld>
             <a:endParaRPr lang="en-US" dirty="0"/>
           </a:p>
@@ -3122,7 +3131,7 @@
           <a:p>
             <a:fld id="{EB141633-13EA-4199-A68F-398721FF4413}" type="datetime1">
               <a:rPr lang="en-US" smtClean="0"/>
-              <a:t>2/26/2020</a:t>
+              <a:t>3/4/2020</a:t>
             </a:fld>
             <a:endParaRPr lang="en-US" dirty="0"/>
           </a:p>
@@ -3495,7 +3504,7 @@
           <a:p>
             <a:fld id="{6405F3C6-F91C-4A7E-A16D-CE51BB392E1E}" type="datetime1">
               <a:rPr lang="en-US" smtClean="0"/>
-              <a:t>2/26/2020</a:t>
+              <a:t>3/4/2020</a:t>
             </a:fld>
             <a:endParaRPr lang="en-US" dirty="0"/>
           </a:p>
@@ -3777,7 +3786,7 @@
           <a:p>
             <a:fld id="{0A52AEB4-5979-4E72-9361-1F576497DB7B}" type="datetime1">
               <a:rPr lang="en-US" smtClean="0"/>
-              <a:t>2/26/2020</a:t>
+              <a:t>3/4/2020</a:t>
             </a:fld>
             <a:endParaRPr lang="en-US" dirty="0"/>
           </a:p>
@@ -4392,11 +4401,11 @@
   <p:clrMapOvr>
     <a:masterClrMapping/>
   </p:clrMapOvr>
-  <mc:AlternateContent xmlns:mc="http://schemas.openxmlformats.org/markup-compatibility/2006">
-    <mc:Choice xmlns:p14="http://schemas.microsoft.com/office/powerpoint/2010/main" Requires="p14">
+  <mc:AlternateContent xmlns:mc="http://schemas.openxmlformats.org/markup-compatibility/2006" xmlns:p14="http://schemas.microsoft.com/office/powerpoint/2010/main">
+    <mc:Choice Requires="p14">
       <p:transition p14:dur="0"/>
     </mc:Choice>
-    <mc:Fallback>
+    <mc:Fallback xmlns="">
       <p:transition/>
     </mc:Fallback>
   </mc:AlternateContent>
@@ -4480,7 +4489,15 @@
             <a:pPr lvl="2" algn="just"/>
             <a:r>
               <a:rPr lang="en-US" sz="2200" smtClean="0"/>
-              <a:t>I have learnt to create and managed project dependency with Apache Maven.</a:t>
+              <a:t>I have learnt to create and managed project </a:t>
+            </a:r>
+            <a:r>
+              <a:rPr lang="en-US" sz="2200" smtClean="0"/>
+              <a:t>dependencies </a:t>
+            </a:r>
+            <a:r>
+              <a:rPr lang="en-US" sz="2200" smtClean="0"/>
+              <a:t>with Apache Maven.</a:t>
             </a:r>
           </a:p>
           <a:p>
@@ -4650,11 +4667,7 @@
             </a:pPr>
             <a:r>
               <a:rPr lang="en-US" sz="2200"/>
-              <a:t>I have learnt to create and export class with </a:t>
-            </a:r>
-            <a:r>
-              <a:rPr lang="en-US" sz="2200"/>
-              <a:t>Typescript</a:t>
+              <a:t>I have learnt to create and export class with Typescript</a:t>
             </a:r>
             <a:r>
               <a:rPr lang="en-US" sz="2200" smtClean="0"/>
@@ -4785,11 +4798,7 @@
             </a:pPr>
             <a:r>
               <a:rPr lang="en-US" sz="2200"/>
-              <a:t>I have learnt to create an Angular project and build a Single Page Web Application with </a:t>
-            </a:r>
-            <a:r>
-              <a:rPr lang="en-US" sz="2200"/>
-              <a:t>it</a:t>
+              <a:t>I have learnt to create an Angular project and build a Single Page Web Application with it</a:t>
             </a:r>
             <a:r>
               <a:rPr lang="en-US" sz="2200" smtClean="0"/>
@@ -4996,11 +5005,11 @@
   <p:clrMapOvr>
     <a:masterClrMapping/>
   </p:clrMapOvr>
-  <mc:AlternateContent xmlns:mc="http://schemas.openxmlformats.org/markup-compatibility/2006">
-    <mc:Choice xmlns:p14="http://schemas.microsoft.com/office/powerpoint/2010/main" Requires="p14">
+  <mc:AlternateContent xmlns:mc="http://schemas.openxmlformats.org/markup-compatibility/2006" xmlns:p14="http://schemas.microsoft.com/office/powerpoint/2010/main">
+    <mc:Choice Requires="p14">
       <p:transition p14:dur="0"/>
     </mc:Choice>
-    <mc:Fallback>
+    <mc:Fallback xmlns="">
       <p:transition/>
     </mc:Fallback>
   </mc:AlternateContent>
@@ -5048,11 +5057,7 @@
           <a:p>
             <a:r>
               <a:rPr lang="en-US" b="1"/>
-              <a:t>CHALLENGES </a:t>
-            </a:r>
-            <a:r>
-              <a:rPr lang="en-US" b="1"/>
-              <a:t>AND </a:t>
+              <a:t>CHALLENGES AND </a:t>
             </a:r>
             <a:r>
               <a:rPr lang="en-US" b="1" smtClean="0"/>
@@ -5099,19 +5104,7 @@
             </a:pPr>
             <a:r>
               <a:rPr lang="en-US" sz="2200"/>
-              <a:t>I had a </a:t>
-            </a:r>
-            <a:r>
-              <a:rPr lang="en-US" sz="2200"/>
-              <a:t>hard </a:t>
-            </a:r>
-            <a:r>
-              <a:rPr lang="en-US" sz="2200"/>
-              <a:t>time and </a:t>
-            </a:r>
-            <a:r>
-              <a:rPr lang="en-US" sz="2200"/>
-              <a:t>felt </a:t>
+              <a:t>I had a hard time and felt </a:t>
             </a:r>
             <a:r>
               <a:rPr lang="en-US" sz="2200" smtClean="0"/>
@@ -5360,11 +5353,11 @@
   <p:clrMapOvr>
     <a:masterClrMapping/>
   </p:clrMapOvr>
-  <mc:AlternateContent xmlns:mc="http://schemas.openxmlformats.org/markup-compatibility/2006">
-    <mc:Choice xmlns:p14="http://schemas.microsoft.com/office/powerpoint/2010/main" Requires="p14">
+  <mc:AlternateContent xmlns:mc="http://schemas.openxmlformats.org/markup-compatibility/2006" xmlns:p14="http://schemas.microsoft.com/office/powerpoint/2010/main">
+    <mc:Choice Requires="p14">
       <p:transition p14:dur="0"/>
     </mc:Choice>
-    <mc:Fallback>
+    <mc:Fallback xmlns="">
       <p:transition/>
     </mc:Fallback>
   </mc:AlternateContent>
@@ -5379,6 +5372,183 @@
 </file>
 
 <file path=ppt/slides/slide16.xml><?xml version="1.0" encoding="utf-8"?>
+<p:sld xmlns:a="http://schemas.openxmlformats.org/drawingml/2006/main" xmlns:r="http://schemas.openxmlformats.org/officeDocument/2006/relationships" xmlns:p="http://schemas.openxmlformats.org/presentationml/2006/main">
+  <p:cSld>
+    <p:spTree>
+      <p:nvGrpSpPr>
+        <p:cNvPr id="1" name=""/>
+        <p:cNvGrpSpPr/>
+        <p:nvPr/>
+      </p:nvGrpSpPr>
+      <p:grpSpPr>
+        <a:xfrm>
+          <a:off x="0" y="0"/>
+          <a:ext cx="0" cy="0"/>
+          <a:chOff x="0" y="0"/>
+          <a:chExt cx="0" cy="0"/>
+        </a:xfrm>
+      </p:grpSpPr>
+      <p:sp>
+        <p:nvSpPr>
+          <p:cNvPr id="2" name="Title 1"/>
+          <p:cNvSpPr>
+            <a:spLocks noGrp="1"/>
+          </p:cNvSpPr>
+          <p:nvPr>
+            <p:ph type="title"/>
+          </p:nvPr>
+        </p:nvSpPr>
+        <p:spPr/>
+        <p:txBody>
+          <a:bodyPr>
+            <a:normAutofit fontScale="90000"/>
+          </a:bodyPr>
+          <a:lstStyle/>
+          <a:p>
+            <a:r>
+              <a:rPr lang="en-US" b="1" smtClean="0"/>
+              <a:t/>
+            </a:r>
+            <a:br>
+              <a:rPr lang="en-US" b="1" smtClean="0"/>
+            </a:br>
+            <a:r>
+              <a:rPr lang="en-US" b="1" smtClean="0"/>
+              <a:t>DEMONSTRATE </a:t>
+            </a:r>
+            <a:r>
+              <a:rPr lang="en-US" b="1"/>
+              <a:t>RESTAURANT BOOKING SYSTEM </a:t>
+            </a:r>
+            <a:r>
+              <a:rPr lang="en-US" b="1"/>
+              <a:t>APPLICATION</a:t>
+            </a:r>
+            <a:r>
+              <a:rPr lang="en-US" b="1" smtClean="0"/>
+              <a:t>.</a:t>
+            </a:r>
+            <a:endParaRPr lang="en-US"/>
+          </a:p>
+        </p:txBody>
+      </p:sp>
+      <p:sp>
+        <p:nvSpPr>
+          <p:cNvPr id="3" name="Content Placeholder 2"/>
+          <p:cNvSpPr>
+            <a:spLocks noGrp="1"/>
+          </p:cNvSpPr>
+          <p:nvPr>
+            <p:ph idx="1"/>
+          </p:nvPr>
+        </p:nvSpPr>
+        <p:spPr/>
+        <p:txBody>
+          <a:bodyPr/>
+          <a:lstStyle/>
+          <a:p>
+            <a:r>
+              <a:rPr lang="en-US" smtClean="0"/>
+              <a:t>The source code of the project can be found on my GitHub:</a:t>
+            </a:r>
+          </a:p>
+          <a:p>
+            <a:pPr lvl="1">
+              <a:buFont typeface="Arial" panose="020B0604020202020204" pitchFamily="34" charset="0"/>
+              <a:buChar char="•"/>
+            </a:pPr>
+            <a:r>
+              <a:rPr lang="en-US"/>
+              <a:t>Backend: </a:t>
+            </a:r>
+            <a:r>
+              <a:rPr lang="en-US">
+                <a:hlinkClick r:id="rId2"/>
+              </a:rPr>
+              <a:t>https</a:t>
+            </a:r>
+            <a:r>
+              <a:rPr lang="en-US">
+                <a:hlinkClick r:id="rId2"/>
+              </a:rPr>
+              <a:t>://</a:t>
+            </a:r>
+            <a:r>
+              <a:rPr lang="en-US" smtClean="0">
+                <a:hlinkClick r:id="rId2"/>
+              </a:rPr>
+              <a:t>github.com/nhatquang9198/Restaurant-Booking-System.git</a:t>
+            </a:r>
+            <a:endParaRPr lang="en-US" smtClean="0"/>
+          </a:p>
+          <a:p>
+            <a:pPr lvl="1">
+              <a:buFont typeface="Arial" panose="020B0604020202020204" pitchFamily="34" charset="0"/>
+              <a:buChar char="•"/>
+            </a:pPr>
+            <a:r>
+              <a:rPr lang="en-US"/>
+              <a:t>Frontend: </a:t>
+            </a:r>
+            <a:r>
+              <a:rPr lang="en-US">
+                <a:hlinkClick r:id="rId3"/>
+              </a:rPr>
+              <a:t>https</a:t>
+            </a:r>
+            <a:r>
+              <a:rPr lang="en-US">
+                <a:hlinkClick r:id="rId3"/>
+              </a:rPr>
+              <a:t>://</a:t>
+            </a:r>
+            <a:r>
+              <a:rPr lang="en-US" smtClean="0">
+                <a:hlinkClick r:id="rId3"/>
+              </a:rPr>
+              <a:t>github.com/nhatquang9198/Restaurant-Booking-FrontEnd.git</a:t>
+            </a:r>
+            <a:endParaRPr lang="en-US" smtClean="0"/>
+          </a:p>
+        </p:txBody>
+      </p:sp>
+      <p:sp>
+        <p:nvSpPr>
+          <p:cNvPr id="4" name="Slide Number Placeholder 3"/>
+          <p:cNvSpPr>
+            <a:spLocks noGrp="1"/>
+          </p:cNvSpPr>
+          <p:nvPr>
+            <p:ph type="sldNum" sz="quarter" idx="12"/>
+          </p:nvPr>
+        </p:nvSpPr>
+        <p:spPr/>
+        <p:txBody>
+          <a:bodyPr/>
+          <a:lstStyle/>
+          <a:p>
+            <a:fld id="{629637A9-119A-49DA-BD12-AAC58B377D80}" type="slidenum">
+              <a:rPr lang="en-US" smtClean="0"/>
+              <a:t>16</a:t>
+            </a:fld>
+            <a:endParaRPr lang="en-US" dirty="0"/>
+          </a:p>
+        </p:txBody>
+      </p:sp>
+    </p:spTree>
+    <p:extLst>
+      <p:ext uri="{BB962C8B-B14F-4D97-AF65-F5344CB8AC3E}">
+        <p14:creationId xmlns:p14="http://schemas.microsoft.com/office/powerpoint/2010/main" val="1851435087"/>
+      </p:ext>
+    </p:extLst>
+  </p:cSld>
+  <p:clrMapOvr>
+    <a:masterClrMapping/>
+  </p:clrMapOvr>
+</p:sld>
+</file>
+
+<file path=ppt/slides/slide17.xml><?xml version="1.0" encoding="utf-8"?>
 <p:sld xmlns:a="http://schemas.openxmlformats.org/drawingml/2006/main" xmlns:r="http://schemas.openxmlformats.org/officeDocument/2006/relationships" xmlns:p="http://schemas.openxmlformats.org/presentationml/2006/main">
   <p:cSld>
     <p:spTree>
@@ -5443,7 +5613,7 @@
             <a:fld id="{4FAB73BC-B049-4115-A692-8D63A059BFB8}" type="slidenum">
               <a:rPr lang="en-US" smtClean="0"/>
               <a:pPr/>
-              <a:t>16</a:t>
+              <a:t>17</a:t>
             </a:fld>
             <a:endParaRPr lang="en-US" dirty="0"/>
           </a:p>
@@ -5601,11 +5771,11 @@
   <p:clrMapOvr>
     <a:masterClrMapping/>
   </p:clrMapOvr>
-  <mc:AlternateContent xmlns:mc="http://schemas.openxmlformats.org/markup-compatibility/2006">
-    <mc:Choice xmlns:p14="http://schemas.microsoft.com/office/powerpoint/2010/main" Requires="p14">
+  <mc:AlternateContent xmlns:mc="http://schemas.openxmlformats.org/markup-compatibility/2006" xmlns:p14="http://schemas.microsoft.com/office/powerpoint/2010/main">
+    <mc:Choice Requires="p14">
       <p:transition p14:dur="10"/>
     </mc:Choice>
-    <mc:Fallback>
+    <mc:Fallback xmlns="">
       <p:transition/>
     </mc:Fallback>
   </mc:AlternateContent>
@@ -5754,11 +5924,11 @@
   <p:clrMapOvr>
     <a:masterClrMapping/>
   </p:clrMapOvr>
-  <mc:AlternateContent xmlns:mc="http://schemas.openxmlformats.org/markup-compatibility/2006">
-    <mc:Choice xmlns:p14="http://schemas.microsoft.com/office/powerpoint/2010/main" Requires="p14">
+  <mc:AlternateContent xmlns:mc="http://schemas.openxmlformats.org/markup-compatibility/2006" xmlns:p14="http://schemas.microsoft.com/office/powerpoint/2010/main">
+    <mc:Choice Requires="p14">
       <p:transition p14:dur="0"/>
     </mc:Choice>
-    <mc:Fallback>
+    <mc:Fallback xmlns="">
       <p:transition/>
     </mc:Fallback>
   </mc:AlternateContent>
@@ -5834,47 +6004,31 @@
             </a:r>
             <a:r>
               <a:rPr lang="en-US"/>
-              <a:t>is </a:t>
+              <a:t>is a </a:t>
+            </a:r>
+            <a:r>
+              <a:rPr lang="en-US" smtClean="0"/>
+              <a:t>privately owned software outsourcing </a:t>
             </a:r>
             <a:r>
               <a:rPr lang="en-US"/>
-              <a:t>a </a:t>
-            </a:r>
-            <a:r>
-              <a:rPr lang="en-US" smtClean="0"/>
-              <a:t>privately owned software outsourcing </a:t>
+              <a:t>company of </a:t>
+            </a:r>
+            <a:r>
+              <a:rPr lang="en-US" smtClean="0"/>
+              <a:t>Vietnam, </a:t>
             </a:r>
             <a:r>
               <a:rPr lang="en-US"/>
-              <a:t>company </a:t>
+              <a:t>with headquarters in </a:t>
+            </a:r>
+            <a:r>
+              <a:rPr lang="en-US" smtClean="0"/>
+              <a:t>Ho Chi Minh City, Vietnam </a:t>
             </a:r>
             <a:r>
               <a:rPr lang="en-US"/>
-              <a:t>of </a:t>
-            </a:r>
-            <a:r>
-              <a:rPr lang="en-US" smtClean="0"/>
-              <a:t>Vietnam, </a:t>
-            </a:r>
-            <a:r>
-              <a:rPr lang="en-US"/>
-              <a:t>with headquarters </a:t>
-            </a:r>
-            <a:r>
-              <a:rPr lang="en-US"/>
-              <a:t>in </a:t>
-            </a:r>
-            <a:r>
-              <a:rPr lang="en-US" smtClean="0"/>
-              <a:t>Ho Chi Minh City, Vietnam </a:t>
-            </a:r>
-            <a:r>
-              <a:rPr lang="en-US"/>
-              <a:t>and other offices in Canada, United States, Ireland, Australia, Singapore. TMA Solutions is one of the largest offshore software </a:t>
-            </a:r>
-            <a:r>
-              <a:rPr lang="en-US"/>
-              <a:t>providers </a:t>
+              <a:t>and other offices in Canada, United States, Ireland, Australia, Singapore. TMA Solutions is one of the largest offshore software providers </a:t>
             </a:r>
             <a:r>
               <a:rPr lang="en-US" smtClean="0"/>
@@ -5893,11 +6047,7 @@
             </a:r>
             <a:r>
               <a:rPr lang="en-US"/>
-              <a:t>2019, TMA reached 2,600 employees and was recognized as one </a:t>
-            </a:r>
-            <a:r>
-              <a:rPr lang="en-US"/>
-              <a:t>of </a:t>
+              <a:t>2019, TMA reached 2,600 employees and was recognized as one of </a:t>
             </a:r>
             <a:r>
               <a:rPr lang="en-US" smtClean="0"/>
@@ -5944,11 +6094,11 @@
   <p:clrMapOvr>
     <a:masterClrMapping/>
   </p:clrMapOvr>
-  <mc:AlternateContent xmlns:mc="http://schemas.openxmlformats.org/markup-compatibility/2006">
-    <mc:Choice xmlns:p14="http://schemas.microsoft.com/office/powerpoint/2010/main" Requires="p14">
+  <mc:AlternateContent xmlns:mc="http://schemas.openxmlformats.org/markup-compatibility/2006" xmlns:p14="http://schemas.microsoft.com/office/powerpoint/2010/main">
+    <mc:Choice Requires="p14">
       <p:transition p14:dur="0"/>
     </mc:Choice>
-    <mc:Fallback>
+    <mc:Fallback xmlns="">
       <p:transition/>
     </mc:Fallback>
   </mc:AlternateContent>
@@ -6104,11 +6254,11 @@
   <p:clrMapOvr>
     <a:masterClrMapping/>
   </p:clrMapOvr>
-  <mc:AlternateContent xmlns:mc="http://schemas.openxmlformats.org/markup-compatibility/2006">
-    <mc:Choice xmlns:p14="http://schemas.microsoft.com/office/powerpoint/2010/main" Requires="p14">
+  <mc:AlternateContent xmlns:mc="http://schemas.openxmlformats.org/markup-compatibility/2006" xmlns:p14="http://schemas.microsoft.com/office/powerpoint/2010/main">
+    <mc:Choice Requires="p14">
       <p:transition p14:dur="0"/>
     </mc:Choice>
-    <mc:Fallback>
+    <mc:Fallback xmlns="">
       <p:transition/>
     </mc:Fallback>
   </mc:AlternateContent>
@@ -6260,7 +6410,23 @@
             </a:pPr>
             <a:r>
               <a:rPr lang="en-US" sz="2200" smtClean="0"/>
-              <a:t>Create and managed project dependency with Apache aven.</a:t>
+              <a:t>Create and managed project </a:t>
+            </a:r>
+            <a:r>
+              <a:rPr lang="en-US" sz="2200" smtClean="0"/>
+              <a:t>dependencies </a:t>
+            </a:r>
+            <a:r>
+              <a:rPr lang="en-US" sz="2200" smtClean="0"/>
+              <a:t>with Apache </a:t>
+            </a:r>
+            <a:r>
+              <a:rPr lang="en-US" sz="2200" smtClean="0"/>
+              <a:t>Maven</a:t>
+            </a:r>
+            <a:r>
+              <a:rPr lang="en-US" sz="2200" smtClean="0"/>
+              <a:t>.</a:t>
             </a:r>
           </a:p>
           <a:p>
@@ -6318,11 +6484,11 @@
   <p:clrMapOvr>
     <a:masterClrMapping/>
   </p:clrMapOvr>
-  <mc:AlternateContent xmlns:mc="http://schemas.openxmlformats.org/markup-compatibility/2006">
-    <mc:Choice xmlns:p14="http://schemas.microsoft.com/office/powerpoint/2010/main" Requires="p14">
+  <mc:AlternateContent xmlns:mc="http://schemas.openxmlformats.org/markup-compatibility/2006" xmlns:p14="http://schemas.microsoft.com/office/powerpoint/2010/main">
+    <mc:Choice Requires="p14">
       <p:transition p14:dur="0"/>
     </mc:Choice>
-    <mc:Fallback>
+    <mc:Fallback xmlns="">
       <p:transition/>
     </mc:Fallback>
   </mc:AlternateContent>
@@ -6409,7 +6575,15 @@
             </a:pPr>
             <a:r>
               <a:rPr lang="en-US" sz="2200" smtClean="0"/>
-              <a:t>Learn  and Create web page with HTML/CSS.</a:t>
+              <a:t>Learn </a:t>
+            </a:r>
+            <a:r>
+              <a:rPr lang="en-US" sz="2200" smtClean="0"/>
+              <a:t>and </a:t>
+            </a:r>
+            <a:r>
+              <a:rPr lang="en-US" sz="2200" smtClean="0"/>
+              <a:t>Create web page with HTML/CSS.</a:t>
             </a:r>
           </a:p>
           <a:p>
@@ -6439,7 +6613,15 @@
             </a:pPr>
             <a:r>
               <a:rPr lang="en-US" sz="2200" smtClean="0"/>
-              <a:t>Learn  and create web page with Angular Technology.</a:t>
+              <a:t>Learn </a:t>
+            </a:r>
+            <a:r>
+              <a:rPr lang="en-US" sz="2200" smtClean="0"/>
+              <a:t>and </a:t>
+            </a:r>
+            <a:r>
+              <a:rPr lang="en-US" sz="2200" smtClean="0"/>
+              <a:t>create web page with Angular Technology.</a:t>
             </a:r>
           </a:p>
           <a:p>
@@ -6449,7 +6631,15 @@
             </a:pPr>
             <a:r>
               <a:rPr lang="en-US" sz="2200" smtClean="0"/>
-              <a:t>Learn and Create Web GUI with Angular Material.</a:t>
+              <a:t>Learn and </a:t>
+            </a:r>
+            <a:r>
+              <a:rPr lang="en-US" sz="2200" smtClean="0"/>
+              <a:t>create </a:t>
+            </a:r>
+            <a:r>
+              <a:rPr lang="en-US" sz="2200" smtClean="0"/>
+              <a:t>Web GUI with Angular Material.</a:t>
             </a:r>
           </a:p>
           <a:p>
@@ -6494,11 +6684,11 @@
   <p:clrMapOvr>
     <a:masterClrMapping/>
   </p:clrMapOvr>
-  <mc:AlternateContent xmlns:mc="http://schemas.openxmlformats.org/markup-compatibility/2006">
-    <mc:Choice xmlns:p14="http://schemas.microsoft.com/office/powerpoint/2010/main" Requires="p14">
+  <mc:AlternateContent xmlns:mc="http://schemas.openxmlformats.org/markup-compatibility/2006" xmlns:p14="http://schemas.microsoft.com/office/powerpoint/2010/main">
+    <mc:Choice Requires="p14">
       <p:transition p14:dur="0"/>
     </mc:Choice>
-    <mc:Fallback>
+    <mc:Fallback xmlns="">
       <p:transition/>
     </mc:Fallback>
   </mc:AlternateContent>
@@ -6606,11 +6796,7 @@
             </a:r>
             <a:r>
               <a:rPr lang="en-US" sz="2600"/>
-              <a:t>BOOKING </a:t>
-            </a:r>
-            <a:r>
-              <a:rPr lang="en-US" sz="2600"/>
-              <a:t>SYSTEM </a:t>
+              <a:t>BOOKING SYSTEM </a:t>
             </a:r>
             <a:r>
               <a:rPr lang="en-US" sz="2600" smtClean="0"/>
@@ -6663,11 +6849,11 @@
   <p:clrMapOvr>
     <a:masterClrMapping/>
   </p:clrMapOvr>
-  <mc:AlternateContent xmlns:mc="http://schemas.openxmlformats.org/markup-compatibility/2006">
-    <mc:Choice xmlns:p14="http://schemas.microsoft.com/office/powerpoint/2010/main" Requires="p14">
+  <mc:AlternateContent xmlns:mc="http://schemas.openxmlformats.org/markup-compatibility/2006" xmlns:p14="http://schemas.microsoft.com/office/powerpoint/2010/main">
+    <mc:Choice Requires="p14">
       <p:transition p14:dur="0"/>
     </mc:Choice>
-    <mc:Fallback>
+    <mc:Fallback xmlns="">
       <p:transition/>
     </mc:Fallback>
   </mc:AlternateContent>
@@ -6744,11 +6930,7 @@
             </a:pPr>
             <a:r>
               <a:rPr lang="en-US" sz="2200" b="1"/>
-              <a:t>Distributed version-control </a:t>
-            </a:r>
-            <a:r>
-              <a:rPr lang="en-US" sz="2200" b="1"/>
-              <a:t>system</a:t>
+              <a:t>Distributed version-control system</a:t>
             </a:r>
             <a:r>
               <a:rPr lang="en-US" sz="2200" b="1" smtClean="0"/>
@@ -6762,7 +6944,15 @@
             </a:pPr>
             <a:r>
               <a:rPr lang="en-US" sz="2200"/>
-              <a:t>I have learnt to create repository, manage repository branch with Git and commit changes, push code onto GitHub.</a:t>
+              <a:t>I have learnt to create repository, manage repository </a:t>
+            </a:r>
+            <a:r>
+              <a:rPr lang="en-US" sz="2200" smtClean="0"/>
+              <a:t>branchs </a:t>
+            </a:r>
+            <a:r>
+              <a:rPr lang="en-US" sz="2200"/>
+              <a:t>with Git and commit changes, push code onto GitHub.</a:t>
             </a:r>
           </a:p>
           <a:p>
@@ -6798,7 +6988,11 @@
             </a:pPr>
             <a:r>
               <a:rPr lang="en-US" sz="2200" smtClean="0"/>
-              <a:t>Learnt about different type </a:t>
+              <a:t>Learnt about different </a:t>
+            </a:r>
+            <a:r>
+              <a:rPr lang="en-US" sz="2200" smtClean="0"/>
+              <a:t>types </a:t>
             </a:r>
             <a:r>
               <a:rPr lang="en-US" sz="2200"/>

</xml_diff>

<commit_message>
change reservation resource and serve
</commit_message>
<xml_diff>
--- a/presentation.pptx
+++ b/presentation.pptx
@@ -4489,15 +4489,7 @@
             <a:pPr lvl="2" algn="just"/>
             <a:r>
               <a:rPr lang="en-US" sz="2200" smtClean="0"/>
-              <a:t>I have learnt to create and managed project </a:t>
-            </a:r>
-            <a:r>
-              <a:rPr lang="en-US" sz="2200" smtClean="0"/>
-              <a:t>dependencies </a:t>
-            </a:r>
-            <a:r>
-              <a:rPr lang="en-US" sz="2200" smtClean="0"/>
-              <a:t>with Apache Maven.</a:t>
+              <a:t>I have learnt to create and managed project dependencies with Apache Maven.</a:t>
             </a:r>
           </a:p>
           <a:p>
@@ -4950,25 +4942,31 @@
             <a:pPr lvl="1"/>
             <a:r>
               <a:rPr lang="en-US" sz="2600"/>
-              <a:t>RESTAURANT BOOKING SYSTEM APPLICATION.</a:t>
-            </a:r>
-          </a:p>
-          <a:p>
-            <a:pPr lvl="1"/>
+              <a:t>DEMONSTRATE </a:t>
+            </a:r>
+            <a:r>
+              <a:rPr lang="en-US" sz="2600" smtClean="0"/>
+              <a:t>RESTAURANT </a:t>
+            </a:r>
             <a:r>
               <a:rPr lang="en-US" sz="2600"/>
-              <a:t>DEMONSTRATION.</a:t>
-            </a:r>
-          </a:p>
-          <a:p>
-            <a:pPr lvl="1"/>
+              <a:t>BOOKING SYSTEM </a:t>
+            </a:r>
+            <a:r>
+              <a:rPr lang="en-US" sz="2600"/>
+              <a:t>APPLICATION</a:t>
+            </a:r>
+            <a:r>
+              <a:rPr lang="en-US" sz="2600" smtClean="0"/>
+              <a:t>.</a:t>
+            </a:r>
             <a:endParaRPr lang="en-US" sz="2600"/>
           </a:p>
           <a:p>
-            <a:endParaRPr lang="en-US"/>
-          </a:p>
-          <a:p>
-            <a:endParaRPr lang="en-US"/>
+            <a:endParaRPr lang="en-US" sz="2600"/>
+          </a:p>
+          <a:p>
+            <a:endParaRPr lang="en-US" sz="2600"/>
           </a:p>
         </p:txBody>
       </p:sp>
@@ -5418,11 +5416,7 @@
             </a:r>
             <a:r>
               <a:rPr lang="en-US" b="1"/>
-              <a:t>RESTAURANT BOOKING SYSTEM </a:t>
-            </a:r>
-            <a:r>
-              <a:rPr lang="en-US" b="1"/>
-              <a:t>APPLICATION</a:t>
+              <a:t>RESTAURANT BOOKING SYSTEM APPLICATION</a:t>
             </a:r>
             <a:r>
               <a:rPr lang="en-US" b="1" smtClean="0"/>
@@ -5465,13 +5459,7 @@
               <a:rPr lang="en-US">
                 <a:hlinkClick r:id="rId2"/>
               </a:rPr>
-              <a:t>https</a:t>
-            </a:r>
-            <a:r>
-              <a:rPr lang="en-US">
-                <a:hlinkClick r:id="rId2"/>
-              </a:rPr>
-              <a:t>://</a:t>
+              <a:t>https://</a:t>
             </a:r>
             <a:r>
               <a:rPr lang="en-US" smtClean="0">
@@ -5494,13 +5482,7 @@
               <a:rPr lang="en-US">
                 <a:hlinkClick r:id="rId3"/>
               </a:rPr>
-              <a:t>https</a:t>
-            </a:r>
-            <a:r>
-              <a:rPr lang="en-US">
-                <a:hlinkClick r:id="rId3"/>
-              </a:rPr>
-              <a:t>://</a:t>
+              <a:t>https://</a:t>
             </a:r>
             <a:r>
               <a:rPr lang="en-US" smtClean="0">
@@ -5728,8 +5710,8 @@
           <a:p>
             <a:pPr lvl="1"/>
             <a:r>
-              <a:rPr lang="en-US" sz="2600" smtClean="0"/>
-              <a:t>DEMONSTRATION RESTAURANT BOOKING SYSTEM APPLICATION.</a:t>
+              <a:rPr lang="en-US" sz="2600"/>
+              <a:t>DEMONSTRATE RESTAURANT BOOKING SYSTEM APPLICATION.</a:t>
             </a:r>
           </a:p>
           <a:p>
@@ -5874,12 +5856,8 @@
           <a:p>
             <a:pPr lvl="1"/>
             <a:r>
-              <a:rPr lang="en-US" sz="2600" smtClean="0"/>
-              <a:t>DEMONSTRATION RESTAURANT </a:t>
-            </a:r>
-            <a:r>
               <a:rPr lang="en-US" sz="2600"/>
-              <a:t>BOOKING SYSTEM APPLICATION.</a:t>
+              <a:t>DEMONSTRATE RESTAURANT BOOKING SYSTEM APPLICATION.</a:t>
             </a:r>
           </a:p>
           <a:p>
@@ -6201,12 +6179,8 @@
           <a:p>
             <a:pPr lvl="1"/>
             <a:r>
-              <a:rPr lang="en-US" sz="2600" smtClean="0"/>
-              <a:t>DEMONSTRATION RESTAURANT </a:t>
-            </a:r>
-            <a:r>
               <a:rPr lang="en-US" sz="2600"/>
-              <a:t>BOOKING SYSTEM APPLICATION.</a:t>
+              <a:t>DEMONSTRATE RESTAURANT BOOKING SYSTEM APPLICATION.</a:t>
             </a:r>
           </a:p>
           <a:p>
@@ -6410,23 +6384,7 @@
             </a:pPr>
             <a:r>
               <a:rPr lang="en-US" sz="2200" smtClean="0"/>
-              <a:t>Create and managed project </a:t>
-            </a:r>
-            <a:r>
-              <a:rPr lang="en-US" sz="2200" smtClean="0"/>
-              <a:t>dependencies </a:t>
-            </a:r>
-            <a:r>
-              <a:rPr lang="en-US" sz="2200" smtClean="0"/>
-              <a:t>with Apache </a:t>
-            </a:r>
-            <a:r>
-              <a:rPr lang="en-US" sz="2200" smtClean="0"/>
-              <a:t>Maven</a:t>
-            </a:r>
-            <a:r>
-              <a:rPr lang="en-US" sz="2200" smtClean="0"/>
-              <a:t>.</a:t>
+              <a:t>Create and managed project dependencies with Apache Maven.</a:t>
             </a:r>
           </a:p>
           <a:p>
@@ -6575,15 +6533,7 @@
             </a:pPr>
             <a:r>
               <a:rPr lang="en-US" sz="2200" smtClean="0"/>
-              <a:t>Learn </a:t>
-            </a:r>
-            <a:r>
-              <a:rPr lang="en-US" sz="2200" smtClean="0"/>
-              <a:t>and </a:t>
-            </a:r>
-            <a:r>
-              <a:rPr lang="en-US" sz="2200" smtClean="0"/>
-              <a:t>Create web page with HTML/CSS.</a:t>
+              <a:t>Learn and Create web page with HTML/CSS.</a:t>
             </a:r>
           </a:p>
           <a:p>
@@ -6613,15 +6563,7 @@
             </a:pPr>
             <a:r>
               <a:rPr lang="en-US" sz="2200" smtClean="0"/>
-              <a:t>Learn </a:t>
-            </a:r>
-            <a:r>
-              <a:rPr lang="en-US" sz="2200" smtClean="0"/>
-              <a:t>and </a:t>
-            </a:r>
-            <a:r>
-              <a:rPr lang="en-US" sz="2200" smtClean="0"/>
-              <a:t>create web page with Angular Technology.</a:t>
+              <a:t>Learn and create web page with Angular Technology.</a:t>
             </a:r>
           </a:p>
           <a:p>
@@ -6631,15 +6573,7 @@
             </a:pPr>
             <a:r>
               <a:rPr lang="en-US" sz="2200" smtClean="0"/>
-              <a:t>Learn and </a:t>
-            </a:r>
-            <a:r>
-              <a:rPr lang="en-US" sz="2200" smtClean="0"/>
-              <a:t>create </a:t>
-            </a:r>
-            <a:r>
-              <a:rPr lang="en-US" sz="2200" smtClean="0"/>
-              <a:t>Web GUI with Angular Material.</a:t>
+              <a:t>Learn and create Web GUI with Angular Material.</a:t>
             </a:r>
           </a:p>
           <a:p>
@@ -6988,11 +6922,7 @@
             </a:pPr>
             <a:r>
               <a:rPr lang="en-US" sz="2200" smtClean="0"/>
-              <a:t>Learnt about different </a:t>
-            </a:r>
-            <a:r>
-              <a:rPr lang="en-US" sz="2200" smtClean="0"/>
-              <a:t>types </a:t>
+              <a:t>Learnt about different types </a:t>
             </a:r>
             <a:r>
               <a:rPr lang="en-US" sz="2200"/>

</xml_diff>